<commit_message>
garbage collection video link
</commit_message>
<xml_diff>
--- a/ClassMaterials/GarbageCollecton1/GarbageCollection.pptx
+++ b/ClassMaterials/GarbageCollecton1/GarbageCollection.pptx
@@ -267,7 +267,7 @@
           <a:p>
             <a:fld id="{4C14442F-1F4F-484B-A48C-24DE1B6741FF}" type="datetimeFigureOut">
               <a:rPr lang="en-US" smtClean="0"/>
-              <a:t>10/29/2023</a:t>
+              <a:t>10/30/2023</a:t>
             </a:fld>
             <a:endParaRPr lang="en-US"/>
           </a:p>
@@ -465,7 +465,7 @@
           <a:p>
             <a:fld id="{4C14442F-1F4F-484B-A48C-24DE1B6741FF}" type="datetimeFigureOut">
               <a:rPr lang="en-US" smtClean="0"/>
-              <a:t>10/29/2023</a:t>
+              <a:t>10/30/2023</a:t>
             </a:fld>
             <a:endParaRPr lang="en-US"/>
           </a:p>
@@ -673,7 +673,7 @@
           <a:p>
             <a:fld id="{4C14442F-1F4F-484B-A48C-24DE1B6741FF}" type="datetimeFigureOut">
               <a:rPr lang="en-US" smtClean="0"/>
-              <a:t>10/29/2023</a:t>
+              <a:t>10/30/2023</a:t>
             </a:fld>
             <a:endParaRPr lang="en-US"/>
           </a:p>
@@ -871,7 +871,7 @@
           <a:p>
             <a:fld id="{4C14442F-1F4F-484B-A48C-24DE1B6741FF}" type="datetimeFigureOut">
               <a:rPr lang="en-US" smtClean="0"/>
-              <a:t>10/29/2023</a:t>
+              <a:t>10/30/2023</a:t>
             </a:fld>
             <a:endParaRPr lang="en-US"/>
           </a:p>
@@ -1146,7 +1146,7 @@
           <a:p>
             <a:fld id="{4C14442F-1F4F-484B-A48C-24DE1B6741FF}" type="datetimeFigureOut">
               <a:rPr lang="en-US" smtClean="0"/>
-              <a:t>10/29/2023</a:t>
+              <a:t>10/30/2023</a:t>
             </a:fld>
             <a:endParaRPr lang="en-US"/>
           </a:p>
@@ -1411,7 +1411,7 @@
           <a:p>
             <a:fld id="{4C14442F-1F4F-484B-A48C-24DE1B6741FF}" type="datetimeFigureOut">
               <a:rPr lang="en-US" smtClean="0"/>
-              <a:t>10/29/2023</a:t>
+              <a:t>10/30/2023</a:t>
             </a:fld>
             <a:endParaRPr lang="en-US"/>
           </a:p>
@@ -1823,7 +1823,7 @@
           <a:p>
             <a:fld id="{4C14442F-1F4F-484B-A48C-24DE1B6741FF}" type="datetimeFigureOut">
               <a:rPr lang="en-US" smtClean="0"/>
-              <a:t>10/29/2023</a:t>
+              <a:t>10/30/2023</a:t>
             </a:fld>
             <a:endParaRPr lang="en-US"/>
           </a:p>
@@ -1964,7 +1964,7 @@
           <a:p>
             <a:fld id="{4C14442F-1F4F-484B-A48C-24DE1B6741FF}" type="datetimeFigureOut">
               <a:rPr lang="en-US" smtClean="0"/>
-              <a:t>10/29/2023</a:t>
+              <a:t>10/30/2023</a:t>
             </a:fld>
             <a:endParaRPr lang="en-US"/>
           </a:p>
@@ -2077,7 +2077,7 @@
           <a:p>
             <a:fld id="{4C14442F-1F4F-484B-A48C-24DE1B6741FF}" type="datetimeFigureOut">
               <a:rPr lang="en-US" smtClean="0"/>
-              <a:t>10/29/2023</a:t>
+              <a:t>10/30/2023</a:t>
             </a:fld>
             <a:endParaRPr lang="en-US"/>
           </a:p>
@@ -2388,7 +2388,7 @@
           <a:p>
             <a:fld id="{4C14442F-1F4F-484B-A48C-24DE1B6741FF}" type="datetimeFigureOut">
               <a:rPr lang="en-US" smtClean="0"/>
-              <a:t>10/29/2023</a:t>
+              <a:t>10/30/2023</a:t>
             </a:fld>
             <a:endParaRPr lang="en-US"/>
           </a:p>
@@ -2676,7 +2676,7 @@
           <a:p>
             <a:fld id="{4C14442F-1F4F-484B-A48C-24DE1B6741FF}" type="datetimeFigureOut">
               <a:rPr lang="en-US" smtClean="0"/>
-              <a:t>10/29/2023</a:t>
+              <a:t>10/30/2023</a:t>
             </a:fld>
             <a:endParaRPr lang="en-US"/>
           </a:p>
@@ -2917,7 +2917,7 @@
           <a:p>
             <a:fld id="{4C14442F-1F4F-484B-A48C-24DE1B6741FF}" type="datetimeFigureOut">
               <a:rPr lang="en-US" smtClean="0"/>
-              <a:t>10/29/2023</a:t>
+              <a:t>10/30/2023</a:t>
             </a:fld>
             <a:endParaRPr lang="en-US"/>
           </a:p>
@@ -3678,7 +3678,7 @@
               <a:rPr lang="en-US" dirty="0">
                 <a:latin typeface="Consolas" panose="020B0609020204030204" pitchFamily="49" charset="0"/>
               </a:rPr>
-              <a:t> (1 2 3 4 5))</a:t>
+              <a:t> (list 1 2 3 4 5))</a:t>
             </a:r>
           </a:p>
           <a:p>

</xml_diff>